<commit_message>
Radium Cycling Diagram Development
Built radium diagram
</commit_message>
<xml_diff>
--- a/Presentation.pptx
+++ b/Presentation.pptx
@@ -16,18 +16,20 @@
     <p:sldId id="266" r:id="rId10"/>
     <p:sldId id="269" r:id="rId11"/>
     <p:sldId id="260" r:id="rId12"/>
-    <p:sldId id="270" r:id="rId13"/>
-    <p:sldId id="272" r:id="rId14"/>
-    <p:sldId id="273" r:id="rId15"/>
-    <p:sldId id="274" r:id="rId16"/>
-    <p:sldId id="275" r:id="rId17"/>
-    <p:sldId id="261" r:id="rId18"/>
-    <p:sldId id="271" r:id="rId19"/>
-    <p:sldId id="277" r:id="rId20"/>
-    <p:sldId id="278" r:id="rId21"/>
-    <p:sldId id="279" r:id="rId22"/>
-    <p:sldId id="280" r:id="rId23"/>
-    <p:sldId id="262" r:id="rId24"/>
+    <p:sldId id="281" r:id="rId13"/>
+    <p:sldId id="270" r:id="rId14"/>
+    <p:sldId id="282" r:id="rId15"/>
+    <p:sldId id="272" r:id="rId16"/>
+    <p:sldId id="273" r:id="rId17"/>
+    <p:sldId id="274" r:id="rId18"/>
+    <p:sldId id="275" r:id="rId19"/>
+    <p:sldId id="261" r:id="rId20"/>
+    <p:sldId id="271" r:id="rId21"/>
+    <p:sldId id="277" r:id="rId22"/>
+    <p:sldId id="278" r:id="rId23"/>
+    <p:sldId id="279" r:id="rId24"/>
+    <p:sldId id="280" r:id="rId25"/>
+    <p:sldId id="262" r:id="rId26"/>
   </p:sldIdLst>
   <p:sldSz cx="12192000" cy="6858000"/>
   <p:notesSz cx="6858000" cy="9144000"/>
@@ -128,7 +130,7 @@
   </p:defaultTextStyle>
   <p:extLst>
     <p:ext uri="{EFAFB233-063F-42B5-8137-9DF3F51BA10A}">
-      <p15:sldGuideLst xmlns:p15="http://schemas.microsoft.com/office/powerpoint/2012/main"/>
+      <p15:sldGuideLst xmlns:p15="http://schemas.microsoft.com/office/powerpoint/2012/main" xmlns=""/>
     </p:ext>
   </p:extLst>
 </p:presentation>
@@ -265,7 +267,7 @@
           <a:p>
             <a:fld id="{31D0073F-64D9-41C6-AFCE-2DD7C5A9D9FB}" type="datetimeFigureOut">
               <a:rPr lang="en-US" smtClean="0"/>
-              <a:t>2/27/2015</a:t>
+              <a:t>2/28/2015</a:t>
             </a:fld>
             <a:endParaRPr lang="en-US"/>
           </a:p>
@@ -435,7 +437,7 @@
           <a:p>
             <a:fld id="{31D0073F-64D9-41C6-AFCE-2DD7C5A9D9FB}" type="datetimeFigureOut">
               <a:rPr lang="en-US" smtClean="0"/>
-              <a:t>2/27/2015</a:t>
+              <a:t>2/28/2015</a:t>
             </a:fld>
             <a:endParaRPr lang="en-US"/>
           </a:p>
@@ -615,7 +617,7 @@
           <a:p>
             <a:fld id="{31D0073F-64D9-41C6-AFCE-2DD7C5A9D9FB}" type="datetimeFigureOut">
               <a:rPr lang="en-US" smtClean="0"/>
-              <a:t>2/27/2015</a:t>
+              <a:t>2/28/2015</a:t>
             </a:fld>
             <a:endParaRPr lang="en-US"/>
           </a:p>
@@ -785,7 +787,7 @@
           <a:p>
             <a:fld id="{31D0073F-64D9-41C6-AFCE-2DD7C5A9D9FB}" type="datetimeFigureOut">
               <a:rPr lang="en-US" smtClean="0"/>
-              <a:t>2/27/2015</a:t>
+              <a:t>2/28/2015</a:t>
             </a:fld>
             <a:endParaRPr lang="en-US"/>
           </a:p>
@@ -1031,7 +1033,7 @@
           <a:p>
             <a:fld id="{31D0073F-64D9-41C6-AFCE-2DD7C5A9D9FB}" type="datetimeFigureOut">
               <a:rPr lang="en-US" smtClean="0"/>
-              <a:t>2/27/2015</a:t>
+              <a:t>2/28/2015</a:t>
             </a:fld>
             <a:endParaRPr lang="en-US"/>
           </a:p>
@@ -1263,7 +1265,7 @@
           <a:p>
             <a:fld id="{31D0073F-64D9-41C6-AFCE-2DD7C5A9D9FB}" type="datetimeFigureOut">
               <a:rPr lang="en-US" smtClean="0"/>
-              <a:t>2/27/2015</a:t>
+              <a:t>2/28/2015</a:t>
             </a:fld>
             <a:endParaRPr lang="en-US"/>
           </a:p>
@@ -1630,7 +1632,7 @@
           <a:p>
             <a:fld id="{31D0073F-64D9-41C6-AFCE-2DD7C5A9D9FB}" type="datetimeFigureOut">
               <a:rPr lang="en-US" smtClean="0"/>
-              <a:t>2/27/2015</a:t>
+              <a:t>2/28/2015</a:t>
             </a:fld>
             <a:endParaRPr lang="en-US"/>
           </a:p>
@@ -1748,7 +1750,7 @@
           <a:p>
             <a:fld id="{31D0073F-64D9-41C6-AFCE-2DD7C5A9D9FB}" type="datetimeFigureOut">
               <a:rPr lang="en-US" smtClean="0"/>
-              <a:t>2/27/2015</a:t>
+              <a:t>2/28/2015</a:t>
             </a:fld>
             <a:endParaRPr lang="en-US"/>
           </a:p>
@@ -1843,7 +1845,7 @@
           <a:p>
             <a:fld id="{31D0073F-64D9-41C6-AFCE-2DD7C5A9D9FB}" type="datetimeFigureOut">
               <a:rPr lang="en-US" smtClean="0"/>
-              <a:t>2/27/2015</a:t>
+              <a:t>2/28/2015</a:t>
             </a:fld>
             <a:endParaRPr lang="en-US"/>
           </a:p>
@@ -2120,7 +2122,7 @@
           <a:p>
             <a:fld id="{31D0073F-64D9-41C6-AFCE-2DD7C5A9D9FB}" type="datetimeFigureOut">
               <a:rPr lang="en-US" smtClean="0"/>
-              <a:t>2/27/2015</a:t>
+              <a:t>2/28/2015</a:t>
             </a:fld>
             <a:endParaRPr lang="en-US"/>
           </a:p>
@@ -2373,7 +2375,7 @@
           <a:p>
             <a:fld id="{31D0073F-64D9-41C6-AFCE-2DD7C5A9D9FB}" type="datetimeFigureOut">
               <a:rPr lang="en-US" smtClean="0"/>
-              <a:t>2/27/2015</a:t>
+              <a:t>2/28/2015</a:t>
             </a:fld>
             <a:endParaRPr lang="en-US"/>
           </a:p>
@@ -2586,7 +2588,7 @@
           <a:p>
             <a:fld id="{31D0073F-64D9-41C6-AFCE-2DD7C5A9D9FB}" type="datetimeFigureOut">
               <a:rPr lang="en-US" smtClean="0"/>
-              <a:t>2/27/2015</a:t>
+              <a:t>2/28/2015</a:t>
             </a:fld>
             <a:endParaRPr lang="en-US"/>
           </a:p>
@@ -3599,32 +3601,108 @@
           </a:p>
         </p:txBody>
       </p:sp>
-      <p:sp>
-        <p:nvSpPr>
-          <p:cNvPr id="5" name="Content Placeholder 4"/>
-          <p:cNvSpPr>
-            <a:spLocks noGrp="1"/>
-          </p:cNvSpPr>
-          <p:nvPr>
-            <p:ph idx="1"/>
-          </p:nvPr>
-        </p:nvSpPr>
-        <p:spPr/>
-        <p:txBody>
-          <a:bodyPr/>
-          <a:lstStyle/>
-          <a:p>
-            <a:r>
-              <a:rPr lang="en-US" dirty="0" smtClean="0"/>
-              <a:t>MAKE A CARTOON</a:t>
-            </a:r>
+      <p:pic>
+        <p:nvPicPr>
+          <p:cNvPr id="7" name="Picture 6"/>
+          <p:cNvPicPr>
+            <a:picLocks noChangeAspect="1"/>
+          </p:cNvPicPr>
+          <p:nvPr/>
+        </p:nvPicPr>
+        <p:blipFill>
+          <a:blip r:embed="rId2" cstate="print">
+            <a:extLst>
+              <a:ext uri="{28A0092B-C50C-407E-A947-70E740481C1C}">
+                <a14:useLocalDpi xmlns:a14="http://schemas.microsoft.com/office/drawing/2010/main" val="0"/>
+              </a:ext>
+            </a:extLst>
+          </a:blip>
+          <a:stretch>
+            <a:fillRect/>
+          </a:stretch>
+        </p:blipFill>
+        <p:spPr>
+          <a:xfrm>
+            <a:off x="1230187" y="1464343"/>
+            <a:ext cx="9595655" cy="5056742"/>
+          </a:xfrm>
+          <a:prstGeom prst="rect">
+            <a:avLst/>
+          </a:prstGeom>
+        </p:spPr>
+      </p:pic>
+      <p:sp>
+        <p:nvSpPr>
+          <p:cNvPr id="8" name="TextBox 7"/>
+          <p:cNvSpPr txBox="1"/>
+          <p:nvPr/>
+        </p:nvSpPr>
+        <p:spPr>
+          <a:xfrm>
+            <a:off x="3054350" y="4190315"/>
+            <a:ext cx="2656164" cy="646331"/>
+          </a:xfrm>
+          <a:prstGeom prst="rect">
+            <a:avLst/>
+          </a:prstGeom>
+          <a:noFill/>
+        </p:spPr>
+        <p:txBody>
+          <a:bodyPr wrap="square" rtlCol="0">
+            <a:spAutoFit/>
+          </a:bodyPr>
+          <a:lstStyle/>
+          <a:p>
+            <a:r>
+              <a:rPr lang="en-US" baseline="30000" dirty="0" smtClean="0"/>
+              <a:t>238</a:t>
+            </a:r>
+            <a:r>
+              <a:rPr lang="en-US" dirty="0" smtClean="0"/>
+              <a:t>U -&gt; </a:t>
+            </a:r>
+            <a:r>
+              <a:rPr lang="en-US" baseline="30000" dirty="0" smtClean="0"/>
+              <a:t>226</a:t>
+            </a:r>
+            <a:r>
+              <a:rPr lang="en-US" dirty="0" smtClean="0"/>
+              <a:t>Ra</a:t>
+            </a:r>
+          </a:p>
+          <a:p>
+            <a:r>
+              <a:rPr lang="en-US" baseline="30000" dirty="0" smtClean="0"/>
+              <a:t>232</a:t>
+            </a:r>
+            <a:r>
+              <a:rPr lang="en-US" dirty="0" smtClean="0"/>
+              <a:t>Th-&gt;</a:t>
+            </a:r>
+            <a:r>
+              <a:rPr lang="en-US" baseline="30000" dirty="0" smtClean="0"/>
+              <a:t>228</a:t>
+            </a:r>
+            <a:r>
+              <a:rPr lang="en-US" dirty="0" smtClean="0"/>
+              <a:t>Ra-&gt;</a:t>
+            </a:r>
+            <a:r>
+              <a:rPr lang="en-US" baseline="30000" dirty="0" smtClean="0"/>
+              <a:t>224</a:t>
+            </a:r>
+            <a:r>
+              <a:rPr lang="en-US" dirty="0" smtClean="0"/>
+              <a:t>Ra</a:t>
+            </a:r>
+            <a:endParaRPr lang="en-US" baseline="30000" dirty="0"/>
           </a:p>
         </p:txBody>
       </p:sp>
     </p:spTree>
     <p:extLst>
       <p:ext uri="{BB962C8B-B14F-4D97-AF65-F5344CB8AC3E}">
-        <p14:creationId xmlns:p14="http://schemas.microsoft.com/office/powerpoint/2010/main" val="2382742584"/>
+        <p14:creationId xmlns:p14="http://schemas.microsoft.com/office/powerpoint/2010/main" val="2404664391"/>
       </p:ext>
     </p:extLst>
   </p:cSld>
@@ -3653,7 +3731,7 @@
       </p:grpSpPr>
       <p:sp>
         <p:nvSpPr>
-          <p:cNvPr id="2" name="Title 1"/>
+          <p:cNvPr id="4" name="Title 3"/>
           <p:cNvSpPr>
             <a:spLocks noGrp="1"/>
           </p:cNvSpPr>
@@ -3668,30 +3746,149 @@
           <a:p>
             <a:r>
               <a:rPr lang="en-US" dirty="0" smtClean="0"/>
-              <a:t>Transport properties…</a:t>
+              <a:t>Radium Cycling</a:t>
             </a:r>
             <a:endParaRPr lang="en-US" dirty="0"/>
           </a:p>
         </p:txBody>
       </p:sp>
-      <p:sp>
-        <p:nvSpPr>
-          <p:cNvPr id="3" name="Content Placeholder 2"/>
-          <p:cNvSpPr>
-            <a:spLocks noGrp="1"/>
-          </p:cNvSpPr>
-          <p:nvPr>
-            <p:ph idx="1"/>
-          </p:nvPr>
-        </p:nvSpPr>
-        <p:spPr/>
-        <p:txBody>
-          <a:bodyPr/>
-          <a:lstStyle/>
-          <a:p>
-            <a:r>
-              <a:rPr lang="en-US" dirty="0" smtClean="0"/>
-              <a:t>IMAGE OF RADIUM SORPTION PROPERTIES FOR QUARTZ SAND</a:t>
+      <p:pic>
+        <p:nvPicPr>
+          <p:cNvPr id="7" name="Picture 6"/>
+          <p:cNvPicPr>
+            <a:picLocks noChangeAspect="1"/>
+          </p:cNvPicPr>
+          <p:nvPr/>
+        </p:nvPicPr>
+        <p:blipFill>
+          <a:blip r:embed="rId2" cstate="print">
+            <a:extLst>
+              <a:ext uri="{28A0092B-C50C-407E-A947-70E740481C1C}">
+                <a14:useLocalDpi xmlns:a14="http://schemas.microsoft.com/office/drawing/2010/main" val="0"/>
+              </a:ext>
+            </a:extLst>
+          </a:blip>
+          <a:stretch>
+            <a:fillRect/>
+          </a:stretch>
+        </p:blipFill>
+        <p:spPr>
+          <a:xfrm>
+            <a:off x="1230187" y="1464343"/>
+            <a:ext cx="9595655" cy="5056742"/>
+          </a:xfrm>
+          <a:prstGeom prst="rect">
+            <a:avLst/>
+          </a:prstGeom>
+        </p:spPr>
+      </p:pic>
+      <p:sp>
+        <p:nvSpPr>
+          <p:cNvPr id="8" name="TextBox 7"/>
+          <p:cNvSpPr txBox="1"/>
+          <p:nvPr/>
+        </p:nvSpPr>
+        <p:spPr>
+          <a:xfrm>
+            <a:off x="3054350" y="4190315"/>
+            <a:ext cx="2656164" cy="646331"/>
+          </a:xfrm>
+          <a:prstGeom prst="rect">
+            <a:avLst/>
+          </a:prstGeom>
+          <a:noFill/>
+        </p:spPr>
+        <p:txBody>
+          <a:bodyPr wrap="square" rtlCol="0">
+            <a:spAutoFit/>
+          </a:bodyPr>
+          <a:lstStyle/>
+          <a:p>
+            <a:r>
+              <a:rPr lang="en-US" baseline="30000" dirty="0" smtClean="0"/>
+              <a:t>238</a:t>
+            </a:r>
+            <a:r>
+              <a:rPr lang="en-US" dirty="0" smtClean="0"/>
+              <a:t>U -&gt; </a:t>
+            </a:r>
+            <a:r>
+              <a:rPr lang="en-US" baseline="30000" dirty="0" smtClean="0"/>
+              <a:t>226</a:t>
+            </a:r>
+            <a:r>
+              <a:rPr lang="en-US" dirty="0" smtClean="0"/>
+              <a:t>Ra</a:t>
+            </a:r>
+          </a:p>
+          <a:p>
+            <a:r>
+              <a:rPr lang="en-US" baseline="30000" dirty="0" smtClean="0"/>
+              <a:t>232</a:t>
+            </a:r>
+            <a:r>
+              <a:rPr lang="en-US" dirty="0" smtClean="0"/>
+              <a:t>Th-&gt;</a:t>
+            </a:r>
+            <a:r>
+              <a:rPr lang="en-US" baseline="30000" dirty="0" smtClean="0"/>
+              <a:t>228</a:t>
+            </a:r>
+            <a:r>
+              <a:rPr lang="en-US" dirty="0" smtClean="0"/>
+              <a:t>Ra-&gt;</a:t>
+            </a:r>
+            <a:r>
+              <a:rPr lang="en-US" baseline="30000" dirty="0" smtClean="0"/>
+              <a:t>224</a:t>
+            </a:r>
+            <a:r>
+              <a:rPr lang="en-US" dirty="0" smtClean="0"/>
+              <a:t>Ra</a:t>
+            </a:r>
+            <a:endParaRPr lang="en-US" baseline="30000" dirty="0"/>
+          </a:p>
+        </p:txBody>
+      </p:sp>
+      <p:sp>
+        <p:nvSpPr>
+          <p:cNvPr id="9" name="Right Arrow 8"/>
+          <p:cNvSpPr/>
+          <p:nvPr/>
+        </p:nvSpPr>
+        <p:spPr>
+          <a:xfrm>
+            <a:off x="5149850" y="4179171"/>
+            <a:ext cx="2546350" cy="668805"/>
+          </a:xfrm>
+          <a:prstGeom prst="rightArrow">
+            <a:avLst/>
+          </a:prstGeom>
+        </p:spPr>
+        <p:style>
+          <a:lnRef idx="2">
+            <a:schemeClr val="accent1">
+              <a:shade val="50000"/>
+            </a:schemeClr>
+          </a:lnRef>
+          <a:fillRef idx="1">
+            <a:schemeClr val="accent1"/>
+          </a:fillRef>
+          <a:effectRef idx="0">
+            <a:schemeClr val="accent1"/>
+          </a:effectRef>
+          <a:fontRef idx="minor">
+            <a:schemeClr val="lt1"/>
+          </a:fontRef>
+        </p:style>
+        <p:txBody>
+          <a:bodyPr rtlCol="0" anchor="ctr"/>
+          <a:lstStyle/>
+          <a:p>
+            <a:pPr algn="ctr"/>
+            <a:r>
+              <a:rPr lang="en-US" dirty="0" smtClean="0"/>
+              <a:t>Groundwater Flow</a:t>
             </a:r>
             <a:endParaRPr lang="en-US" dirty="0"/>
           </a:p>
@@ -3700,7 +3897,7 @@
     </p:spTree>
     <p:extLst>
       <p:ext uri="{BB962C8B-B14F-4D97-AF65-F5344CB8AC3E}">
-        <p14:creationId xmlns:p14="http://schemas.microsoft.com/office/powerpoint/2010/main" val="1706735475"/>
+        <p14:creationId xmlns:p14="http://schemas.microsoft.com/office/powerpoint/2010/main" val="2382742584"/>
       </p:ext>
     </p:extLst>
   </p:cSld>
@@ -3729,6 +3926,377 @@
       </p:grpSpPr>
       <p:sp>
         <p:nvSpPr>
+          <p:cNvPr id="4" name="Title 3"/>
+          <p:cNvSpPr>
+            <a:spLocks noGrp="1"/>
+          </p:cNvSpPr>
+          <p:nvPr>
+            <p:ph type="title"/>
+          </p:nvPr>
+        </p:nvSpPr>
+        <p:spPr/>
+        <p:txBody>
+          <a:bodyPr/>
+          <a:lstStyle/>
+          <a:p>
+            <a:r>
+              <a:rPr lang="en-US" dirty="0" smtClean="0"/>
+              <a:t>Radium Cycling</a:t>
+            </a:r>
+            <a:endParaRPr lang="en-US" dirty="0"/>
+          </a:p>
+        </p:txBody>
+      </p:sp>
+      <p:pic>
+        <p:nvPicPr>
+          <p:cNvPr id="7" name="Picture 6"/>
+          <p:cNvPicPr>
+            <a:picLocks noChangeAspect="1"/>
+          </p:cNvPicPr>
+          <p:nvPr/>
+        </p:nvPicPr>
+        <p:blipFill>
+          <a:blip r:embed="rId2" cstate="print">
+            <a:extLst>
+              <a:ext uri="{28A0092B-C50C-407E-A947-70E740481C1C}">
+                <a14:useLocalDpi xmlns:a14="http://schemas.microsoft.com/office/drawing/2010/main" val="0"/>
+              </a:ext>
+            </a:extLst>
+          </a:blip>
+          <a:stretch>
+            <a:fillRect/>
+          </a:stretch>
+        </p:blipFill>
+        <p:spPr>
+          <a:xfrm>
+            <a:off x="1230187" y="1464343"/>
+            <a:ext cx="9595655" cy="5056742"/>
+          </a:xfrm>
+          <a:prstGeom prst="rect">
+            <a:avLst/>
+          </a:prstGeom>
+        </p:spPr>
+      </p:pic>
+      <p:sp>
+        <p:nvSpPr>
+          <p:cNvPr id="8" name="TextBox 7"/>
+          <p:cNvSpPr txBox="1"/>
+          <p:nvPr/>
+        </p:nvSpPr>
+        <p:spPr>
+          <a:xfrm>
+            <a:off x="3055487" y="4191006"/>
+            <a:ext cx="2656164" cy="646331"/>
+          </a:xfrm>
+          <a:prstGeom prst="rect">
+            <a:avLst/>
+          </a:prstGeom>
+          <a:noFill/>
+        </p:spPr>
+        <p:txBody>
+          <a:bodyPr wrap="square" rtlCol="0">
+            <a:spAutoFit/>
+          </a:bodyPr>
+          <a:lstStyle/>
+          <a:p>
+            <a:r>
+              <a:rPr lang="en-US" baseline="30000" dirty="0" smtClean="0"/>
+              <a:t>238</a:t>
+            </a:r>
+            <a:r>
+              <a:rPr lang="en-US" dirty="0" smtClean="0"/>
+              <a:t>U -&gt; </a:t>
+            </a:r>
+            <a:r>
+              <a:rPr lang="en-US" baseline="30000" dirty="0" smtClean="0"/>
+              <a:t>226</a:t>
+            </a:r>
+            <a:r>
+              <a:rPr lang="en-US" dirty="0" smtClean="0"/>
+              <a:t>Ra</a:t>
+            </a:r>
+          </a:p>
+          <a:p>
+            <a:r>
+              <a:rPr lang="en-US" baseline="30000" dirty="0" smtClean="0"/>
+              <a:t>232</a:t>
+            </a:r>
+            <a:r>
+              <a:rPr lang="en-US" dirty="0" smtClean="0"/>
+              <a:t>Th-&gt;</a:t>
+            </a:r>
+            <a:r>
+              <a:rPr lang="en-US" baseline="30000" dirty="0" smtClean="0"/>
+              <a:t>228</a:t>
+            </a:r>
+            <a:r>
+              <a:rPr lang="en-US" dirty="0" smtClean="0"/>
+              <a:t>Ra-&gt;</a:t>
+            </a:r>
+            <a:r>
+              <a:rPr lang="en-US" baseline="30000" dirty="0" smtClean="0"/>
+              <a:t>224</a:t>
+            </a:r>
+            <a:r>
+              <a:rPr lang="en-US" dirty="0" smtClean="0"/>
+              <a:t>Ra</a:t>
+            </a:r>
+            <a:endParaRPr lang="en-US" baseline="30000" dirty="0"/>
+          </a:p>
+        </p:txBody>
+      </p:sp>
+      <p:cxnSp>
+        <p:nvCxnSpPr>
+          <p:cNvPr id="19" name="Straight Connector 18"/>
+          <p:cNvCxnSpPr/>
+          <p:nvPr/>
+        </p:nvCxnSpPr>
+        <p:spPr>
+          <a:xfrm flipH="1">
+            <a:off x="2433638" y="5781675"/>
+            <a:ext cx="1262062" cy="0"/>
+          </a:xfrm>
+          <a:prstGeom prst="line">
+            <a:avLst/>
+          </a:prstGeom>
+          <a:ln w="19050">
+            <a:solidFill>
+              <a:schemeClr val="accent2">
+                <a:lumMod val="75000"/>
+              </a:schemeClr>
+            </a:solidFill>
+          </a:ln>
+        </p:spPr>
+        <p:style>
+          <a:lnRef idx="1">
+            <a:schemeClr val="accent1"/>
+          </a:lnRef>
+          <a:fillRef idx="0">
+            <a:schemeClr val="accent1"/>
+          </a:fillRef>
+          <a:effectRef idx="0">
+            <a:schemeClr val="accent1"/>
+          </a:effectRef>
+          <a:fontRef idx="minor">
+            <a:schemeClr val="tx1"/>
+          </a:fontRef>
+        </p:style>
+      </p:cxnSp>
+      <p:cxnSp>
+        <p:nvCxnSpPr>
+          <p:cNvPr id="21" name="Straight Connector 20"/>
+          <p:cNvCxnSpPr/>
+          <p:nvPr/>
+        </p:nvCxnSpPr>
+        <p:spPr>
+          <a:xfrm flipV="1">
+            <a:off x="2433638" y="2790825"/>
+            <a:ext cx="0" cy="2990850"/>
+          </a:xfrm>
+          <a:prstGeom prst="line">
+            <a:avLst/>
+          </a:prstGeom>
+          <a:ln w="19050">
+            <a:solidFill>
+              <a:schemeClr val="accent2">
+                <a:lumMod val="75000"/>
+              </a:schemeClr>
+            </a:solidFill>
+          </a:ln>
+        </p:spPr>
+        <p:style>
+          <a:lnRef idx="1">
+            <a:schemeClr val="accent1"/>
+          </a:lnRef>
+          <a:fillRef idx="0">
+            <a:schemeClr val="accent1"/>
+          </a:fillRef>
+          <a:effectRef idx="0">
+            <a:schemeClr val="accent1"/>
+          </a:effectRef>
+          <a:fontRef idx="minor">
+            <a:schemeClr val="tx1"/>
+          </a:fontRef>
+        </p:style>
+      </p:cxnSp>
+      <p:cxnSp>
+        <p:nvCxnSpPr>
+          <p:cNvPr id="25" name="Elbow Connector 24"/>
+          <p:cNvCxnSpPr/>
+          <p:nvPr/>
+        </p:nvCxnSpPr>
+        <p:spPr>
+          <a:xfrm>
+            <a:off x="2433638" y="2790825"/>
+            <a:ext cx="1390650" cy="566738"/>
+          </a:xfrm>
+          <a:prstGeom prst="bentConnector3">
+            <a:avLst>
+              <a:gd name="adj1" fmla="val 100000"/>
+            </a:avLst>
+          </a:prstGeom>
+          <a:ln w="19050">
+            <a:solidFill>
+              <a:schemeClr val="accent2">
+                <a:lumMod val="75000"/>
+              </a:schemeClr>
+            </a:solidFill>
+            <a:tailEnd type="arrow"/>
+          </a:ln>
+        </p:spPr>
+        <p:style>
+          <a:lnRef idx="1">
+            <a:schemeClr val="accent1"/>
+          </a:lnRef>
+          <a:fillRef idx="0">
+            <a:schemeClr val="accent1"/>
+          </a:fillRef>
+          <a:effectRef idx="0">
+            <a:schemeClr val="accent1"/>
+          </a:effectRef>
+          <a:fontRef idx="minor">
+            <a:schemeClr val="tx1"/>
+          </a:fontRef>
+        </p:style>
+      </p:cxnSp>
+      <p:sp>
+        <p:nvSpPr>
+          <p:cNvPr id="30" name="TextBox 29"/>
+          <p:cNvSpPr txBox="1"/>
+          <p:nvPr/>
+        </p:nvSpPr>
+        <p:spPr>
+          <a:xfrm>
+            <a:off x="3912734" y="2904917"/>
+            <a:ext cx="1814513" cy="338554"/>
+          </a:xfrm>
+          <a:prstGeom prst="rect">
+            <a:avLst/>
+          </a:prstGeom>
+          <a:noFill/>
+        </p:spPr>
+        <p:txBody>
+          <a:bodyPr wrap="square" rtlCol="0">
+            <a:spAutoFit/>
+          </a:bodyPr>
+          <a:lstStyle/>
+          <a:p>
+            <a:r>
+              <a:rPr lang="en-US" sz="1600" dirty="0" smtClean="0"/>
+              <a:t>Produced Water</a:t>
+            </a:r>
+            <a:endParaRPr lang="en-US" sz="1600" dirty="0"/>
+          </a:p>
+        </p:txBody>
+      </p:sp>
+    </p:spTree>
+    <p:extLst>
+      <p:ext uri="{BB962C8B-B14F-4D97-AF65-F5344CB8AC3E}">
+        <p14:creationId xmlns:p14="http://schemas.microsoft.com/office/powerpoint/2010/main" val="1889651305"/>
+      </p:ext>
+    </p:extLst>
+  </p:cSld>
+  <p:clrMapOvr>
+    <a:masterClrMapping/>
+  </p:clrMapOvr>
+</p:sld>
+</file>
+
+<file path=ppt/slides/slide15.xml><?xml version="1.0" encoding="utf-8"?>
+<p:sld xmlns:a="http://schemas.openxmlformats.org/drawingml/2006/main" xmlns:r="http://schemas.openxmlformats.org/officeDocument/2006/relationships" xmlns:p="http://schemas.openxmlformats.org/presentationml/2006/main">
+  <p:cSld>
+    <p:spTree>
+      <p:nvGrpSpPr>
+        <p:cNvPr id="1" name=""/>
+        <p:cNvGrpSpPr/>
+        <p:nvPr/>
+      </p:nvGrpSpPr>
+      <p:grpSpPr>
+        <a:xfrm>
+          <a:off x="0" y="0"/>
+          <a:ext cx="0" cy="0"/>
+          <a:chOff x="0" y="0"/>
+          <a:chExt cx="0" cy="0"/>
+        </a:xfrm>
+      </p:grpSpPr>
+      <p:sp>
+        <p:nvSpPr>
+          <p:cNvPr id="2" name="Title 1"/>
+          <p:cNvSpPr>
+            <a:spLocks noGrp="1"/>
+          </p:cNvSpPr>
+          <p:nvPr>
+            <p:ph type="title"/>
+          </p:nvPr>
+        </p:nvSpPr>
+        <p:spPr/>
+        <p:txBody>
+          <a:bodyPr/>
+          <a:lstStyle/>
+          <a:p>
+            <a:r>
+              <a:rPr lang="en-US" dirty="0" smtClean="0"/>
+              <a:t>Transport properties…</a:t>
+            </a:r>
+            <a:endParaRPr lang="en-US" dirty="0"/>
+          </a:p>
+        </p:txBody>
+      </p:sp>
+      <p:sp>
+        <p:nvSpPr>
+          <p:cNvPr id="3" name="Content Placeholder 2"/>
+          <p:cNvSpPr>
+            <a:spLocks noGrp="1"/>
+          </p:cNvSpPr>
+          <p:nvPr>
+            <p:ph idx="1"/>
+          </p:nvPr>
+        </p:nvSpPr>
+        <p:spPr/>
+        <p:txBody>
+          <a:bodyPr/>
+          <a:lstStyle/>
+          <a:p>
+            <a:r>
+              <a:rPr lang="en-US" dirty="0" smtClean="0"/>
+              <a:t>IMAGE OF RADIUM SORPTION PROPERTIES FOR QUARTZ SAND</a:t>
+            </a:r>
+            <a:endParaRPr lang="en-US" dirty="0"/>
+          </a:p>
+        </p:txBody>
+      </p:sp>
+    </p:spTree>
+    <p:extLst>
+      <p:ext uri="{BB962C8B-B14F-4D97-AF65-F5344CB8AC3E}">
+        <p14:creationId xmlns:p14="http://schemas.microsoft.com/office/powerpoint/2010/main" val="1706735475"/>
+      </p:ext>
+    </p:extLst>
+  </p:cSld>
+  <p:clrMapOvr>
+    <a:masterClrMapping/>
+  </p:clrMapOvr>
+</p:sld>
+</file>
+
+<file path=ppt/slides/slide16.xml><?xml version="1.0" encoding="utf-8"?>
+<p:sld xmlns:a="http://schemas.openxmlformats.org/drawingml/2006/main" xmlns:r="http://schemas.openxmlformats.org/officeDocument/2006/relationships" xmlns:p="http://schemas.openxmlformats.org/presentationml/2006/main">
+  <p:cSld>
+    <p:spTree>
+      <p:nvGrpSpPr>
+        <p:cNvPr id="1" name=""/>
+        <p:cNvGrpSpPr/>
+        <p:nvPr/>
+      </p:nvGrpSpPr>
+      <p:grpSpPr>
+        <a:xfrm>
+          <a:off x="0" y="0"/>
+          <a:ext cx="0" cy="0"/>
+          <a:chOff x="0" y="0"/>
+          <a:chExt cx="0" cy="0"/>
+        </a:xfrm>
+      </p:grpSpPr>
+      <p:sp>
+        <p:nvSpPr>
           <p:cNvPr id="2" name="Title 1"/>
           <p:cNvSpPr>
             <a:spLocks noGrp="1"/>
@@ -3788,7 +4356,7 @@
 </p:sld>
 </file>
 
-<file path=ppt/slides/slide15.xml><?xml version="1.0" encoding="utf-8"?>
+<file path=ppt/slides/slide17.xml><?xml version="1.0" encoding="utf-8"?>
 <p:sld xmlns:a="http://schemas.openxmlformats.org/drawingml/2006/main" xmlns:r="http://schemas.openxmlformats.org/officeDocument/2006/relationships" xmlns:p="http://schemas.openxmlformats.org/presentationml/2006/main">
   <p:cSld>
     <p:spTree>
@@ -3870,7 +4438,7 @@
 </p:sld>
 </file>
 
-<file path=ppt/slides/slide16.xml><?xml version="1.0" encoding="utf-8"?>
+<file path=ppt/slides/slide18.xml><?xml version="1.0" encoding="utf-8"?>
 <p:sld xmlns:a="http://schemas.openxmlformats.org/drawingml/2006/main" xmlns:r="http://schemas.openxmlformats.org/officeDocument/2006/relationships" xmlns:p="http://schemas.openxmlformats.org/presentationml/2006/main">
   <p:cSld>
     <p:spTree>
@@ -4033,154 +4601,6 @@
 </p:sld>
 </file>
 
-<file path=ppt/slides/slide17.xml><?xml version="1.0" encoding="utf-8"?>
-<p:sld xmlns:a="http://schemas.openxmlformats.org/drawingml/2006/main" xmlns:r="http://schemas.openxmlformats.org/officeDocument/2006/relationships" xmlns:p="http://schemas.openxmlformats.org/presentationml/2006/main">
-  <p:cSld>
-    <p:spTree>
-      <p:nvGrpSpPr>
-        <p:cNvPr id="1" name=""/>
-        <p:cNvGrpSpPr/>
-        <p:nvPr/>
-      </p:nvGrpSpPr>
-      <p:grpSpPr>
-        <a:xfrm>
-          <a:off x="0" y="0"/>
-          <a:ext cx="0" cy="0"/>
-          <a:chOff x="0" y="0"/>
-          <a:chExt cx="0" cy="0"/>
-        </a:xfrm>
-      </p:grpSpPr>
-      <p:sp>
-        <p:nvSpPr>
-          <p:cNvPr id="4" name="Title 3"/>
-          <p:cNvSpPr>
-            <a:spLocks noGrp="1"/>
-          </p:cNvSpPr>
-          <p:nvPr>
-            <p:ph type="title"/>
-          </p:nvPr>
-        </p:nvSpPr>
-        <p:spPr/>
-        <p:txBody>
-          <a:bodyPr/>
-          <a:lstStyle/>
-          <a:p>
-            <a:r>
-              <a:rPr lang="en-US" dirty="0" smtClean="0"/>
-              <a:t>Iodine</a:t>
-            </a:r>
-            <a:endParaRPr lang="en-US" dirty="0"/>
-          </a:p>
-        </p:txBody>
-      </p:sp>
-      <p:sp>
-        <p:nvSpPr>
-          <p:cNvPr id="6" name="Text Placeholder 5"/>
-          <p:cNvSpPr>
-            <a:spLocks noGrp="1"/>
-          </p:cNvSpPr>
-          <p:nvPr>
-            <p:ph type="body" idx="1"/>
-          </p:nvPr>
-        </p:nvSpPr>
-        <p:spPr/>
-        <p:txBody>
-          <a:bodyPr/>
-          <a:lstStyle/>
-          <a:p>
-            <a:endParaRPr lang="en-US"/>
-          </a:p>
-        </p:txBody>
-      </p:sp>
-    </p:spTree>
-    <p:extLst>
-      <p:ext uri="{BB962C8B-B14F-4D97-AF65-F5344CB8AC3E}">
-        <p14:creationId xmlns:p14="http://schemas.microsoft.com/office/powerpoint/2010/main" val="3654518950"/>
-      </p:ext>
-    </p:extLst>
-  </p:cSld>
-  <p:clrMapOvr>
-    <a:masterClrMapping/>
-  </p:clrMapOvr>
-</p:sld>
-</file>
-
-<file path=ppt/slides/slide18.xml><?xml version="1.0" encoding="utf-8"?>
-<p:sld xmlns:a="http://schemas.openxmlformats.org/drawingml/2006/main" xmlns:r="http://schemas.openxmlformats.org/officeDocument/2006/relationships" xmlns:p="http://schemas.openxmlformats.org/presentationml/2006/main">
-  <p:cSld>
-    <p:spTree>
-      <p:nvGrpSpPr>
-        <p:cNvPr id="1" name=""/>
-        <p:cNvGrpSpPr/>
-        <p:nvPr/>
-      </p:nvGrpSpPr>
-      <p:grpSpPr>
-        <a:xfrm>
-          <a:off x="0" y="0"/>
-          <a:ext cx="0" cy="0"/>
-          <a:chOff x="0" y="0"/>
-          <a:chExt cx="0" cy="0"/>
-        </a:xfrm>
-      </p:grpSpPr>
-      <p:sp>
-        <p:nvSpPr>
-          <p:cNvPr id="9" name="Title 8"/>
-          <p:cNvSpPr>
-            <a:spLocks noGrp="1"/>
-          </p:cNvSpPr>
-          <p:nvPr>
-            <p:ph type="title"/>
-          </p:nvPr>
-        </p:nvSpPr>
-        <p:spPr/>
-        <p:txBody>
-          <a:bodyPr/>
-          <a:lstStyle/>
-          <a:p>
-            <a:r>
-              <a:rPr lang="en-US" dirty="0" smtClean="0"/>
-              <a:t>Iodine Cycling</a:t>
-            </a:r>
-            <a:endParaRPr lang="en-US" dirty="0"/>
-          </a:p>
-        </p:txBody>
-      </p:sp>
-      <p:sp>
-        <p:nvSpPr>
-          <p:cNvPr id="10" name="Content Placeholder 9"/>
-          <p:cNvSpPr>
-            <a:spLocks noGrp="1"/>
-          </p:cNvSpPr>
-          <p:nvPr>
-            <p:ph idx="1"/>
-          </p:nvPr>
-        </p:nvSpPr>
-        <p:spPr/>
-        <p:txBody>
-          <a:bodyPr/>
-          <a:lstStyle/>
-          <a:p>
-            <a:r>
-              <a:rPr lang="en-US" dirty="0" smtClean="0"/>
-              <a:t>FIGURE OF CYCLING</a:t>
-            </a:r>
-            <a:endParaRPr lang="en-US" dirty="0"/>
-          </a:p>
-        </p:txBody>
-      </p:sp>
-    </p:spTree>
-    <p:extLst>
-      <p:ext uri="{BB962C8B-B14F-4D97-AF65-F5344CB8AC3E}">
-        <p14:creationId xmlns:p14="http://schemas.microsoft.com/office/powerpoint/2010/main" val="1749583555"/>
-      </p:ext>
-    </p:extLst>
-  </p:cSld>
-  <p:clrMapOvr>
-    <a:masterClrMapping/>
-  </p:clrMapOvr>
-</p:sld>
-</file>
-
 <file path=ppt/slides/slide19.xml><?xml version="1.0" encoding="utf-8"?>
 <p:sld xmlns:a="http://schemas.openxmlformats.org/drawingml/2006/main" xmlns:r="http://schemas.openxmlformats.org/officeDocument/2006/relationships" xmlns:p="http://schemas.openxmlformats.org/presentationml/2006/main">
   <p:cSld>
@@ -4200,7 +4620,7 @@
       </p:grpSpPr>
       <p:sp>
         <p:nvSpPr>
-          <p:cNvPr id="2" name="Title 1"/>
+          <p:cNvPr id="4" name="Title 3"/>
           <p:cNvSpPr>
             <a:spLocks noGrp="1"/>
           </p:cNvSpPr>
@@ -4215,7 +4635,7 @@
           <a:p>
             <a:r>
               <a:rPr lang="en-US" dirty="0" smtClean="0"/>
-              <a:t>Interactions with aquifer solids</a:t>
+              <a:t>Iodine</a:t>
             </a:r>
             <a:endParaRPr lang="en-US" dirty="0"/>
           </a:p>
@@ -4223,48 +4643,27 @@
       </p:sp>
       <p:sp>
         <p:nvSpPr>
-          <p:cNvPr id="3" name="Content Placeholder 2"/>
-          <p:cNvSpPr>
-            <a:spLocks noGrp="1"/>
-          </p:cNvSpPr>
-          <p:nvPr>
-            <p:ph idx="1"/>
-          </p:nvPr>
-        </p:nvSpPr>
-        <p:spPr/>
-        <p:txBody>
-          <a:bodyPr/>
-          <a:lstStyle/>
-          <a:p>
-            <a:r>
-              <a:rPr lang="en-US" dirty="0" smtClean="0"/>
-              <a:t>Figure of relevant, understood processes</a:t>
-            </a:r>
-          </a:p>
-          <a:p>
-            <a:pPr lvl="1"/>
-            <a:r>
-              <a:rPr lang="en-US" dirty="0" smtClean="0"/>
-              <a:t>Mineral partitioning</a:t>
-            </a:r>
-          </a:p>
-          <a:p>
-            <a:pPr lvl="1"/>
-            <a:r>
-              <a:rPr lang="en-US" dirty="0" smtClean="0"/>
-              <a:t>Organic matter sorption and transformation</a:t>
-            </a:r>
-          </a:p>
-          <a:p>
-            <a:pPr lvl="1"/>
-            <a:endParaRPr lang="en-US" dirty="0"/>
+          <p:cNvPr id="6" name="Text Placeholder 5"/>
+          <p:cNvSpPr>
+            <a:spLocks noGrp="1"/>
+          </p:cNvSpPr>
+          <p:nvPr>
+            <p:ph type="body" idx="1"/>
+          </p:nvPr>
+        </p:nvSpPr>
+        <p:spPr/>
+        <p:txBody>
+          <a:bodyPr/>
+          <a:lstStyle/>
+          <a:p>
+            <a:endParaRPr lang="en-US"/>
           </a:p>
         </p:txBody>
       </p:sp>
     </p:spTree>
     <p:extLst>
       <p:ext uri="{BB962C8B-B14F-4D97-AF65-F5344CB8AC3E}">
-        <p14:creationId xmlns:p14="http://schemas.microsoft.com/office/powerpoint/2010/main" val="3906547553"/>
+        <p14:creationId xmlns:p14="http://schemas.microsoft.com/office/powerpoint/2010/main" val="3654518950"/>
       </p:ext>
     </p:extLst>
   </p:cSld>
@@ -4398,7 +4797,7 @@
       </p:grpSpPr>
       <p:sp>
         <p:nvSpPr>
-          <p:cNvPr id="2" name="Title 1"/>
+          <p:cNvPr id="9" name="Title 8"/>
           <p:cNvSpPr>
             <a:spLocks noGrp="1"/>
           </p:cNvSpPr>
@@ -4413,7 +4812,7 @@
           <a:p>
             <a:r>
               <a:rPr lang="en-US" dirty="0" smtClean="0"/>
-              <a:t>Sorption and Transport Experiments</a:t>
+              <a:t>Iodine Cycling</a:t>
             </a:r>
             <a:endParaRPr lang="en-US" dirty="0"/>
           </a:p>
@@ -4421,7 +4820,7 @@
       </p:sp>
       <p:sp>
         <p:nvSpPr>
-          <p:cNvPr id="3" name="Content Placeholder 2"/>
+          <p:cNvPr id="10" name="Content Placeholder 9"/>
           <p:cNvSpPr>
             <a:spLocks noGrp="1"/>
           </p:cNvSpPr>
@@ -4434,14 +4833,18 @@
           <a:bodyPr/>
           <a:lstStyle/>
           <a:p>
-            <a:endParaRPr lang="en-US"/>
+            <a:r>
+              <a:rPr lang="en-US" dirty="0" smtClean="0"/>
+              <a:t>FIGURE OF CYCLING</a:t>
+            </a:r>
+            <a:endParaRPr lang="en-US" dirty="0"/>
           </a:p>
         </p:txBody>
       </p:sp>
     </p:spTree>
     <p:extLst>
       <p:ext uri="{BB962C8B-B14F-4D97-AF65-F5344CB8AC3E}">
-        <p14:creationId xmlns:p14="http://schemas.microsoft.com/office/powerpoint/2010/main" val="3174231657"/>
+        <p14:creationId xmlns:p14="http://schemas.microsoft.com/office/powerpoint/2010/main" val="1749583555"/>
       </p:ext>
     </p:extLst>
   </p:cSld>
@@ -4485,7 +4888,7 @@
           <a:p>
             <a:r>
               <a:rPr lang="en-US" dirty="0" smtClean="0"/>
-              <a:t>Synchrotron Work</a:t>
+              <a:t>Interactions with aquifer solids</a:t>
             </a:r>
             <a:endParaRPr lang="en-US" dirty="0"/>
           </a:p>
@@ -4508,8 +4911,25 @@
           <a:p>
             <a:r>
               <a:rPr lang="en-US" dirty="0" smtClean="0"/>
-              <a:t>XANES spectra for iodine species</a:t>
-            </a:r>
+              <a:t>Figure of relevant, understood processes</a:t>
+            </a:r>
+          </a:p>
+          <a:p>
+            <a:pPr lvl="1"/>
+            <a:r>
+              <a:rPr lang="en-US" dirty="0" smtClean="0"/>
+              <a:t>Mineral partitioning</a:t>
+            </a:r>
+          </a:p>
+          <a:p>
+            <a:pPr lvl="1"/>
+            <a:r>
+              <a:rPr lang="en-US" dirty="0" smtClean="0"/>
+              <a:t>Organic matter sorption and transformation</a:t>
+            </a:r>
+          </a:p>
+          <a:p>
+            <a:pPr lvl="1"/>
             <a:endParaRPr lang="en-US" dirty="0"/>
           </a:p>
         </p:txBody>
@@ -4517,7 +4937,7 @@
     </p:spTree>
     <p:extLst>
       <p:ext uri="{BB962C8B-B14F-4D97-AF65-F5344CB8AC3E}">
-        <p14:creationId xmlns:p14="http://schemas.microsoft.com/office/powerpoint/2010/main" val="3838390611"/>
+        <p14:creationId xmlns:p14="http://schemas.microsoft.com/office/powerpoint/2010/main" val="3906547553"/>
       </p:ext>
     </p:extLst>
   </p:cSld>
@@ -4561,6 +4981,154 @@
           <a:p>
             <a:r>
               <a:rPr lang="en-US" dirty="0" smtClean="0"/>
+              <a:t>Sorption and Transport Experiments</a:t>
+            </a:r>
+            <a:endParaRPr lang="en-US" dirty="0"/>
+          </a:p>
+        </p:txBody>
+      </p:sp>
+      <p:sp>
+        <p:nvSpPr>
+          <p:cNvPr id="3" name="Content Placeholder 2"/>
+          <p:cNvSpPr>
+            <a:spLocks noGrp="1"/>
+          </p:cNvSpPr>
+          <p:nvPr>
+            <p:ph idx="1"/>
+          </p:nvPr>
+        </p:nvSpPr>
+        <p:spPr/>
+        <p:txBody>
+          <a:bodyPr/>
+          <a:lstStyle/>
+          <a:p>
+            <a:endParaRPr lang="en-US"/>
+          </a:p>
+        </p:txBody>
+      </p:sp>
+    </p:spTree>
+    <p:extLst>
+      <p:ext uri="{BB962C8B-B14F-4D97-AF65-F5344CB8AC3E}">
+        <p14:creationId xmlns:p14="http://schemas.microsoft.com/office/powerpoint/2010/main" val="3174231657"/>
+      </p:ext>
+    </p:extLst>
+  </p:cSld>
+  <p:clrMapOvr>
+    <a:masterClrMapping/>
+  </p:clrMapOvr>
+</p:sld>
+</file>
+
+<file path=ppt/slides/slide23.xml><?xml version="1.0" encoding="utf-8"?>
+<p:sld xmlns:a="http://schemas.openxmlformats.org/drawingml/2006/main" xmlns:r="http://schemas.openxmlformats.org/officeDocument/2006/relationships" xmlns:p="http://schemas.openxmlformats.org/presentationml/2006/main">
+  <p:cSld>
+    <p:spTree>
+      <p:nvGrpSpPr>
+        <p:cNvPr id="1" name=""/>
+        <p:cNvGrpSpPr/>
+        <p:nvPr/>
+      </p:nvGrpSpPr>
+      <p:grpSpPr>
+        <a:xfrm>
+          <a:off x="0" y="0"/>
+          <a:ext cx="0" cy="0"/>
+          <a:chOff x="0" y="0"/>
+          <a:chExt cx="0" cy="0"/>
+        </a:xfrm>
+      </p:grpSpPr>
+      <p:sp>
+        <p:nvSpPr>
+          <p:cNvPr id="2" name="Title 1"/>
+          <p:cNvSpPr>
+            <a:spLocks noGrp="1"/>
+          </p:cNvSpPr>
+          <p:nvPr>
+            <p:ph type="title"/>
+          </p:nvPr>
+        </p:nvSpPr>
+        <p:spPr/>
+        <p:txBody>
+          <a:bodyPr/>
+          <a:lstStyle/>
+          <a:p>
+            <a:r>
+              <a:rPr lang="en-US" dirty="0" smtClean="0"/>
+              <a:t>Synchrotron Work</a:t>
+            </a:r>
+            <a:endParaRPr lang="en-US" dirty="0"/>
+          </a:p>
+        </p:txBody>
+      </p:sp>
+      <p:sp>
+        <p:nvSpPr>
+          <p:cNvPr id="3" name="Content Placeholder 2"/>
+          <p:cNvSpPr>
+            <a:spLocks noGrp="1"/>
+          </p:cNvSpPr>
+          <p:nvPr>
+            <p:ph idx="1"/>
+          </p:nvPr>
+        </p:nvSpPr>
+        <p:spPr/>
+        <p:txBody>
+          <a:bodyPr/>
+          <a:lstStyle/>
+          <a:p>
+            <a:r>
+              <a:rPr lang="en-US" dirty="0" smtClean="0"/>
+              <a:t>XANES spectra for iodine species</a:t>
+            </a:r>
+            <a:endParaRPr lang="en-US" dirty="0"/>
+          </a:p>
+        </p:txBody>
+      </p:sp>
+    </p:spTree>
+    <p:extLst>
+      <p:ext uri="{BB962C8B-B14F-4D97-AF65-F5344CB8AC3E}">
+        <p14:creationId xmlns:p14="http://schemas.microsoft.com/office/powerpoint/2010/main" val="3838390611"/>
+      </p:ext>
+    </p:extLst>
+  </p:cSld>
+  <p:clrMapOvr>
+    <a:masterClrMapping/>
+  </p:clrMapOvr>
+</p:sld>
+</file>
+
+<file path=ppt/slides/slide24.xml><?xml version="1.0" encoding="utf-8"?>
+<p:sld xmlns:a="http://schemas.openxmlformats.org/drawingml/2006/main" xmlns:r="http://schemas.openxmlformats.org/officeDocument/2006/relationships" xmlns:p="http://schemas.openxmlformats.org/presentationml/2006/main">
+  <p:cSld>
+    <p:spTree>
+      <p:nvGrpSpPr>
+        <p:cNvPr id="1" name=""/>
+        <p:cNvGrpSpPr/>
+        <p:nvPr/>
+      </p:nvGrpSpPr>
+      <p:grpSpPr>
+        <a:xfrm>
+          <a:off x="0" y="0"/>
+          <a:ext cx="0" cy="0"/>
+          <a:chOff x="0" y="0"/>
+          <a:chExt cx="0" cy="0"/>
+        </a:xfrm>
+      </p:grpSpPr>
+      <p:sp>
+        <p:nvSpPr>
+          <p:cNvPr id="2" name="Title 1"/>
+          <p:cNvSpPr>
+            <a:spLocks noGrp="1"/>
+          </p:cNvSpPr>
+          <p:nvPr>
+            <p:ph type="title"/>
+          </p:nvPr>
+        </p:nvSpPr>
+        <p:spPr/>
+        <p:txBody>
+          <a:bodyPr/>
+          <a:lstStyle/>
+          <a:p>
+            <a:r>
+              <a:rPr lang="en-US" dirty="0" smtClean="0"/>
               <a:t>Fieldwork in HI</a:t>
             </a:r>
             <a:endParaRPr lang="en-US" dirty="0"/>
@@ -4626,7 +5194,7 @@
 </p:sld>
 </file>
 
-<file path=ppt/slides/slide23.xml><?xml version="1.0" encoding="utf-8"?>
+<file path=ppt/slides/slide25.xml><?xml version="1.0" encoding="utf-8"?>
 <p:sld xmlns:a="http://schemas.openxmlformats.org/drawingml/2006/main" xmlns:r="http://schemas.openxmlformats.org/officeDocument/2006/relationships" xmlns:p="http://schemas.openxmlformats.org/presentationml/2006/main">
   <p:cSld>
     <p:spTree>
@@ -5179,23 +5747,7 @@
           <a:p>
             <a:r>
               <a:rPr lang="en-US" dirty="0" smtClean="0"/>
-              <a:t>Improved understanding of </a:t>
-            </a:r>
-            <a:r>
-              <a:rPr lang="en-US" dirty="0" smtClean="0"/>
-              <a:t>isotope </a:t>
-            </a:r>
-            <a:r>
-              <a:rPr lang="en-US" dirty="0" smtClean="0"/>
-              <a:t>geochemistry </a:t>
-            </a:r>
-            <a:r>
-              <a:rPr lang="en-US" dirty="0" smtClean="0"/>
-              <a:t>enables tracer </a:t>
-            </a:r>
-            <a:r>
-              <a:rPr lang="en-US" dirty="0" smtClean="0"/>
-              <a:t>usage</a:t>
+              <a:t>Improved understanding of isotope geochemistry enables tracer usage</a:t>
             </a:r>
             <a:endParaRPr lang="en-US" dirty="0"/>
           </a:p>
@@ -5212,7 +5764,6 @@
               <a:rPr lang="en-US" dirty="0" smtClean="0"/>
               <a:t>Radium as tracer for hydraulic fracturing, other deep water releases</a:t>
             </a:r>
-            <a:endParaRPr lang="en-US" dirty="0" smtClean="0"/>
           </a:p>
         </p:txBody>
       </p:sp>
@@ -5843,7 +6394,7 @@
   <a:extraClrSchemeLst/>
   <a:extLst>
     <a:ext uri="{05A4C25C-085E-4340-85A3-A5531E510DB2}">
-      <thm15:themeFamily xmlns:thm15="http://schemas.microsoft.com/office/thememl/2012/main" name="Office Theme" id="{62F939B6-93AF-4DB8-9C6B-D6C7DFDC589F}" vid="{4A3C46E8-61CC-4603-A589-7422A47A8E4A}"/>
+      <thm15:themeFamily xmlns:thm15="http://schemas.microsoft.com/office/thememl/2012/main" xmlns="" name="Office Theme" id="{62F939B6-93AF-4DB8-9C6B-D6C7DFDC589F}" vid="{4A3C46E8-61CC-4603-A589-7422A47A8E4A}"/>
     </a:ext>
   </a:extLst>
 </a:theme>

</xml_diff>